<commit_message>
fixed some more qualität form issues
</commit_message>
<xml_diff>
--- a/presentation.pptx
+++ b/presentation.pptx
@@ -18276,14 +18276,14 @@
           <p:nvPr>
             <p:extLst>
               <p:ext uri="{D42A27DB-BD31-4B8C-83A1-F6EECF244321}">
-                <p14:modId xmlns:p14="http://schemas.microsoft.com/office/powerpoint/2010/main" val="513926666"/>
+                <p14:modId xmlns:p14="http://schemas.microsoft.com/office/powerpoint/2010/main" val="3230179131"/>
               </p:ext>
             </p:extLst>
           </p:nvPr>
         </p:nvGraphicFramePr>
         <p:xfrm>
           <a:off x="1864575" y="234325"/>
-          <a:ext cx="6977925" cy="4717350"/>
+          <a:ext cx="7094151" cy="4717350"/>
         </p:xfrm>
         <a:graphic>
           <a:graphicData uri="http://schemas.openxmlformats.org/drawingml/2006/table">
@@ -18293,28 +18293,28 @@
                 <a:tableStyleId>{D27C064D-90EB-4798-9A18-A089F428169C}</a:tableStyleId>
               </a:tblPr>
               <a:tblGrid>
-                <a:gridCol w="775325">
+                <a:gridCol w="816061">
                   <a:extLst>
                     <a:ext uri="{9D8B030D-6E8A-4147-A177-3AD203B41FA5}">
                       <a16:colId xmlns:a16="http://schemas.microsoft.com/office/drawing/2014/main" val="20000"/>
                     </a:ext>
                   </a:extLst>
                 </a:gridCol>
-                <a:gridCol w="775325">
+                <a:gridCol w="734589">
                   <a:extLst>
                     <a:ext uri="{9D8B030D-6E8A-4147-A177-3AD203B41FA5}">
                       <a16:colId xmlns:a16="http://schemas.microsoft.com/office/drawing/2014/main" val="20001"/>
                     </a:ext>
                   </a:extLst>
                 </a:gridCol>
-                <a:gridCol w="775325">
+                <a:gridCol w="823913">
                   <a:extLst>
                     <a:ext uri="{9D8B030D-6E8A-4147-A177-3AD203B41FA5}">
                       <a16:colId xmlns:a16="http://schemas.microsoft.com/office/drawing/2014/main" val="20002"/>
                     </a:ext>
                   </a:extLst>
                 </a:gridCol>
-                <a:gridCol w="775325">
+                <a:gridCol w="842963">
                   <a:extLst>
                     <a:ext uri="{9D8B030D-6E8A-4147-A177-3AD203B41FA5}">
                       <a16:colId xmlns:a16="http://schemas.microsoft.com/office/drawing/2014/main" val="20003"/>
@@ -19129,7 +19129,7 @@
                         <a:buNone/>
                       </a:pPr>
                       <a:r>
-                        <a:rPr lang="en" sz="1800" b="1">
+                        <a:rPr lang="en" sz="1800" b="1" i="1" dirty="0">
                           <a:latin typeface="Calibri"/>
                           <a:ea typeface="Calibri"/>
                           <a:cs typeface="Calibri"/>
@@ -19137,7 +19137,7 @@
                         </a:rPr>
                         <a:t>/</a:t>
                       </a:r>
-                      <a:endParaRPr sz="1800" b="1">
+                      <a:endParaRPr sz="1800" b="1" i="1" dirty="0">
                         <a:latin typeface="Calibri"/>
                         <a:ea typeface="Calibri"/>
                         <a:cs typeface="Calibri"/>
@@ -20609,7 +20609,7 @@
                         <a:buNone/>
                       </a:pPr>
                       <a:r>
-                        <a:rPr lang="en" sz="2400" b="1"/>
+                        <a:rPr lang="en" sz="2400" b="1" dirty="0"/>
                         <a:t>↑</a:t>
                       </a:r>
                       <a:endParaRPr sz="2400" b="1" dirty="0"/>

</xml_diff>